<commit_message>
- Added two additional illustrative figures
</commit_message>
<xml_diff>
--- a/FiniteElementFeatureTracking.pptx
+++ b/FiniteElementFeatureTracking.pptx
@@ -104,6 +104,22 @@
       </a:defRPr>
     </a:lvl9pPr>
   </p:defaultTextStyle>
+  <p:extLst>
+    <p:ext uri="{EFAFB233-063F-42B5-8137-9DF3F51BA10A}">
+      <p15:sldGuideLst xmlns:p15="http://schemas.microsoft.com/office/powerpoint/2012/main">
+        <p15:guide id="1" orient="horz" pos="1728">
+          <p15:clr>
+            <a:srgbClr val="A4A3A4"/>
+          </p15:clr>
+        </p15:guide>
+        <p15:guide id="2" pos="3456">
+          <p15:clr>
+            <a:srgbClr val="A4A3A4"/>
+          </p15:clr>
+        </p15:guide>
+      </p15:sldGuideLst>
+    </p:ext>
+  </p:extLst>
 </p:presentation>
 </file>
 
@@ -288,7 +304,7 @@
           <a:p>
             <a:fld id="{5291AED2-4106-1C4E-B48C-EAB7537C7223}" type="datetimeFigureOut">
               <a:rPr lang="en-US" smtClean="0"/>
-              <a:t>9/22/15</a:t>
+              <a:t>7/13/16</a:t>
             </a:fld>
             <a:endParaRPr lang="en-US"/>
           </a:p>
@@ -458,7 +474,7 @@
           <a:p>
             <a:fld id="{5291AED2-4106-1C4E-B48C-EAB7537C7223}" type="datetimeFigureOut">
               <a:rPr lang="en-US" smtClean="0"/>
-              <a:t>9/22/15</a:t>
+              <a:t>7/13/16</a:t>
             </a:fld>
             <a:endParaRPr lang="en-US"/>
           </a:p>
@@ -638,7 +654,7 @@
           <a:p>
             <a:fld id="{5291AED2-4106-1C4E-B48C-EAB7537C7223}" type="datetimeFigureOut">
               <a:rPr lang="en-US" smtClean="0"/>
-              <a:t>9/22/15</a:t>
+              <a:t>7/13/16</a:t>
             </a:fld>
             <a:endParaRPr lang="en-US"/>
           </a:p>
@@ -808,7 +824,7 @@
           <a:p>
             <a:fld id="{5291AED2-4106-1C4E-B48C-EAB7537C7223}" type="datetimeFigureOut">
               <a:rPr lang="en-US" smtClean="0"/>
-              <a:t>9/22/15</a:t>
+              <a:t>7/13/16</a:t>
             </a:fld>
             <a:endParaRPr lang="en-US"/>
           </a:p>
@@ -1054,7 +1070,7 @@
           <a:p>
             <a:fld id="{5291AED2-4106-1C4E-B48C-EAB7537C7223}" type="datetimeFigureOut">
               <a:rPr lang="en-US" smtClean="0"/>
-              <a:t>9/22/15</a:t>
+              <a:t>7/13/16</a:t>
             </a:fld>
             <a:endParaRPr lang="en-US"/>
           </a:p>
@@ -1342,7 +1358,7 @@
           <a:p>
             <a:fld id="{5291AED2-4106-1C4E-B48C-EAB7537C7223}" type="datetimeFigureOut">
               <a:rPr lang="en-US" smtClean="0"/>
-              <a:t>9/22/15</a:t>
+              <a:t>7/13/16</a:t>
             </a:fld>
             <a:endParaRPr lang="en-US"/>
           </a:p>
@@ -1769,7 +1785,7 @@
           <a:p>
             <a:fld id="{5291AED2-4106-1C4E-B48C-EAB7537C7223}" type="datetimeFigureOut">
               <a:rPr lang="en-US" smtClean="0"/>
-              <a:t>9/22/15</a:t>
+              <a:t>7/13/16</a:t>
             </a:fld>
             <a:endParaRPr lang="en-US"/>
           </a:p>
@@ -1887,7 +1903,7 @@
           <a:p>
             <a:fld id="{5291AED2-4106-1C4E-B48C-EAB7537C7223}" type="datetimeFigureOut">
               <a:rPr lang="en-US" smtClean="0"/>
-              <a:t>9/22/15</a:t>
+              <a:t>7/13/16</a:t>
             </a:fld>
             <a:endParaRPr lang="en-US"/>
           </a:p>
@@ -1982,7 +1998,7 @@
           <a:p>
             <a:fld id="{5291AED2-4106-1C4E-B48C-EAB7537C7223}" type="datetimeFigureOut">
               <a:rPr lang="en-US" smtClean="0"/>
-              <a:t>9/22/15</a:t>
+              <a:t>7/13/16</a:t>
             </a:fld>
             <a:endParaRPr lang="en-US"/>
           </a:p>
@@ -2259,7 +2275,7 @@
           <a:p>
             <a:fld id="{5291AED2-4106-1C4E-B48C-EAB7537C7223}" type="datetimeFigureOut">
               <a:rPr lang="en-US" smtClean="0"/>
-              <a:t>9/22/15</a:t>
+              <a:t>7/13/16</a:t>
             </a:fld>
             <a:endParaRPr lang="en-US"/>
           </a:p>
@@ -2512,7 +2528,7 @@
           <a:p>
             <a:fld id="{5291AED2-4106-1C4E-B48C-EAB7537C7223}" type="datetimeFigureOut">
               <a:rPr lang="en-US" smtClean="0"/>
-              <a:t>9/22/15</a:t>
+              <a:t>7/13/16</a:t>
             </a:fld>
             <a:endParaRPr lang="en-US"/>
           </a:p>
@@ -2725,7 +2741,7 @@
           <a:p>
             <a:fld id="{5291AED2-4106-1C4E-B48C-EAB7537C7223}" type="datetimeFigureOut">
               <a:rPr lang="en-US" smtClean="0"/>
-              <a:t>9/22/15</a:t>
+              <a:t>7/13/16</a:t>
             </a:fld>
             <a:endParaRPr lang="en-US"/>
           </a:p>
@@ -4766,8 +4782,8 @@
         </p:nvSpPr>
         <p:spPr>
           <a:xfrm>
-            <a:off x="2842097" y="2057699"/>
-            <a:ext cx="406932" cy="461665"/>
+            <a:off x="2937285" y="2090363"/>
+            <a:ext cx="461986" cy="646331"/>
           </a:xfrm>
           <a:prstGeom prst="rect">
             <a:avLst/>
@@ -4781,15 +4797,17 @@
           <a:lstStyle/>
           <a:p>
             <a:r>
-              <a:rPr lang="en-US" sz="2400" b="1" dirty="0" smtClean="0">
-                <a:latin typeface="Helvetica"/>
-                <a:cs typeface="Helvetica"/>
+              <a:rPr lang="en-US" sz="3600" dirty="0" smtClean="0">
+                <a:latin typeface="Courier New" charset="0"/>
+                <a:ea typeface="Courier New" charset="0"/>
+                <a:cs typeface="Courier New" charset="0"/>
               </a:rPr>
               <a:t>A</a:t>
             </a:r>
-            <a:endParaRPr lang="en-US" sz="2400" b="1" dirty="0">
-              <a:latin typeface="Helvetica"/>
-              <a:cs typeface="Helvetica"/>
+            <a:endParaRPr lang="en-US" sz="3600" dirty="0">
+              <a:latin typeface="Courier New" charset="0"/>
+              <a:ea typeface="Courier New" charset="0"/>
+              <a:cs typeface="Courier New" charset="0"/>
             </a:endParaRPr>
           </a:p>
         </p:txBody>
@@ -4926,38 +4944,6 @@
           </a:fontRef>
         </p:style>
       </p:cxnSp>
-      <p:sp>
-        <p:nvSpPr>
-          <p:cNvPr id="103" name="TextBox 102"/>
-          <p:cNvSpPr txBox="1"/>
-          <p:nvPr/>
-        </p:nvSpPr>
-        <p:spPr>
-          <a:xfrm>
-            <a:off x="5522293" y="3059248"/>
-            <a:ext cx="406932" cy="461665"/>
-          </a:xfrm>
-          <a:prstGeom prst="rect">
-            <a:avLst/>
-          </a:prstGeom>
-          <a:noFill/>
-        </p:spPr>
-        <p:txBody>
-          <a:bodyPr wrap="none" rtlCol="0">
-            <a:spAutoFit/>
-          </a:bodyPr>
-          <a:lstStyle/>
-          <a:p>
-            <a:r>
-              <a:rPr lang="en-US" sz="2400" b="1" dirty="0">
-                <a:latin typeface="Helvetica"/>
-                <a:cs typeface="Helvetica"/>
-              </a:rPr>
-              <a:t>B</a:t>
-            </a:r>
-          </a:p>
-        </p:txBody>
-      </p:sp>
       <p:cxnSp>
         <p:nvCxnSpPr>
           <p:cNvPr id="104" name="Straight Arrow Connector 103"/>
@@ -5090,6 +5076,44 @@
           </a:fontRef>
         </p:style>
       </p:cxnSp>
+      <p:sp>
+        <p:nvSpPr>
+          <p:cNvPr id="49" name="TextBox 48"/>
+          <p:cNvSpPr txBox="1"/>
+          <p:nvPr/>
+        </p:nvSpPr>
+        <p:spPr>
+          <a:xfrm>
+            <a:off x="5637459" y="2907546"/>
+            <a:ext cx="461986" cy="646331"/>
+          </a:xfrm>
+          <a:prstGeom prst="rect">
+            <a:avLst/>
+          </a:prstGeom>
+          <a:noFill/>
+        </p:spPr>
+        <p:txBody>
+          <a:bodyPr wrap="none" rtlCol="0">
+            <a:spAutoFit/>
+          </a:bodyPr>
+          <a:lstStyle/>
+          <a:p>
+            <a:r>
+              <a:rPr lang="en-US" sz="3600" dirty="0" smtClean="0">
+                <a:latin typeface="Courier New" charset="0"/>
+                <a:ea typeface="Courier New" charset="0"/>
+                <a:cs typeface="Courier New" charset="0"/>
+              </a:rPr>
+              <a:t>B</a:t>
+            </a:r>
+            <a:endParaRPr lang="en-US" sz="3600" dirty="0">
+              <a:latin typeface="Courier New" charset="0"/>
+              <a:ea typeface="Courier New" charset="0"/>
+              <a:cs typeface="Courier New" charset="0"/>
+            </a:endParaRPr>
+          </a:p>
+        </p:txBody>
+      </p:sp>
     </p:spTree>
     <p:extLst>
       <p:ext uri="{BB962C8B-B14F-4D97-AF65-F5344CB8AC3E}">

</xml_diff>